<commit_message>
Update presentation file and vision document
</commit_message>
<xml_diff>
--- a/PA2/Nhom14-PA2-Presentation.pptx
+++ b/PA2/Nhom14-PA2-Presentation.pptx
@@ -6,15 +6,18 @@
     <p:sldMasterId id="2147483661" r:id="rId2"/>
   </p:sldMasterIdLst>
   <p:sldIdLst>
-    <p:sldId id="256" r:id="rId3"/>
+    <p:sldId id="270" r:id="rId3"/>
     <p:sldId id="257" r:id="rId4"/>
     <p:sldId id="260" r:id="rId5"/>
-    <p:sldId id="261" r:id="rId6"/>
-    <p:sldId id="263" r:id="rId7"/>
-    <p:sldId id="264" r:id="rId8"/>
-    <p:sldId id="262" r:id="rId9"/>
-    <p:sldId id="265" r:id="rId10"/>
-    <p:sldId id="259" r:id="rId11"/>
+    <p:sldId id="269" r:id="rId6"/>
+    <p:sldId id="261" r:id="rId7"/>
+    <p:sldId id="263" r:id="rId8"/>
+    <p:sldId id="264" r:id="rId9"/>
+    <p:sldId id="262" r:id="rId10"/>
+    <p:sldId id="265" r:id="rId11"/>
+    <p:sldId id="267" r:id="rId12"/>
+    <p:sldId id="268" r:id="rId13"/>
+    <p:sldId id="259" r:id="rId14"/>
   </p:sldIdLst>
   <p:sldSz cx="9144000" cy="6858000" type="screen4x3"/>
   <p:notesSz cx="6858000" cy="9144000"/>
@@ -3812,7 +3815,7 @@
         <p:spPr>
           <a:xfrm>
             <a:off x="72008" y="2492801"/>
-            <a:ext cx="3707904" cy="400110"/>
+            <a:ext cx="3707904" cy="369332"/>
           </a:xfrm>
           <a:prstGeom prst="rect">
             <a:avLst/>
@@ -3835,7 +3838,7 @@
               <a:defRPr/>
             </a:pPr>
             <a:r>
-              <a:rPr lang="en-US" altLang="ko-KR" sz="2000" dirty="0" err="1" smtClean="0">
+              <a:rPr lang="en-US" altLang="ko-KR" dirty="0" err="1" smtClean="0">
                 <a:solidFill>
                   <a:schemeClr val="tx1">
                     <a:lumMod val="75000"/>
@@ -3849,7 +3852,7 @@
               <a:t>Môn</a:t>
             </a:r>
             <a:r>
-              <a:rPr lang="en-US" altLang="ko-KR" sz="2000" dirty="0" smtClean="0">
+              <a:rPr lang="en-US" altLang="ko-KR" dirty="0" smtClean="0">
                 <a:solidFill>
                   <a:schemeClr val="tx1">
                     <a:lumMod val="75000"/>
@@ -3863,7 +3866,7 @@
               <a:t>: </a:t>
             </a:r>
             <a:r>
-              <a:rPr lang="en-US" altLang="ko-KR" sz="2000" dirty="0" err="1" smtClean="0">
+              <a:rPr lang="en-US" altLang="ko-KR" dirty="0" err="1" smtClean="0">
                 <a:solidFill>
                   <a:schemeClr val="tx1">
                     <a:lumMod val="75000"/>
@@ -3877,7 +3880,7 @@
               <a:t>Thiết</a:t>
             </a:r>
             <a:r>
-              <a:rPr lang="en-US" altLang="ko-KR" sz="2000" dirty="0" smtClean="0">
+              <a:rPr lang="en-US" altLang="ko-KR" dirty="0" smtClean="0">
                 <a:solidFill>
                   <a:schemeClr val="tx1">
                     <a:lumMod val="75000"/>
@@ -3891,7 +3894,7 @@
               <a:t> </a:t>
             </a:r>
             <a:r>
-              <a:rPr lang="en-US" altLang="ko-KR" sz="2000" dirty="0" err="1" smtClean="0">
+              <a:rPr lang="en-US" altLang="ko-KR" dirty="0" err="1" smtClean="0">
                 <a:solidFill>
                   <a:schemeClr val="tx1">
                     <a:lumMod val="75000"/>
@@ -3905,7 +3908,7 @@
               <a:t>Kế</a:t>
             </a:r>
             <a:r>
-              <a:rPr lang="en-US" altLang="ko-KR" sz="2000" dirty="0" smtClean="0">
+              <a:rPr lang="en-US" altLang="ko-KR" dirty="0" smtClean="0">
                 <a:solidFill>
                   <a:schemeClr val="tx1">
                     <a:lumMod val="75000"/>
@@ -3919,7 +3922,7 @@
               <a:t> </a:t>
             </a:r>
             <a:r>
-              <a:rPr lang="en-US" altLang="ko-KR" sz="2000" dirty="0" err="1" smtClean="0">
+              <a:rPr lang="en-US" altLang="ko-KR" dirty="0" err="1" smtClean="0">
                 <a:solidFill>
                   <a:schemeClr val="tx1">
                     <a:lumMod val="75000"/>
@@ -3933,7 +3936,7 @@
               <a:t>Giao</a:t>
             </a:r>
             <a:r>
-              <a:rPr lang="en-US" altLang="ko-KR" sz="2000" dirty="0" smtClean="0">
+              <a:rPr lang="en-US" altLang="ko-KR" dirty="0" smtClean="0">
                 <a:solidFill>
                   <a:schemeClr val="tx1">
                     <a:lumMod val="75000"/>
@@ -3947,7 +3950,7 @@
               <a:t> </a:t>
             </a:r>
             <a:r>
-              <a:rPr lang="en-US" altLang="ko-KR" sz="2000" dirty="0" err="1" smtClean="0">
+              <a:rPr lang="en-US" altLang="ko-KR" dirty="0" err="1" smtClean="0">
                 <a:solidFill>
                   <a:schemeClr val="tx1">
                     <a:lumMod val="75000"/>
@@ -3960,7 +3963,7 @@
               </a:rPr>
               <a:t>Diện</a:t>
             </a:r>
-            <a:endParaRPr kumimoji="0" lang="en-US" altLang="ko-KR" sz="2000" dirty="0">
+            <a:endParaRPr kumimoji="0" lang="en-US" altLang="ko-KR" dirty="0">
               <a:solidFill>
                 <a:schemeClr val="tx1">
                   <a:lumMod val="75000"/>
@@ -4076,7 +4079,7 @@
         <p:spPr>
           <a:xfrm>
             <a:off x="0" y="6597932"/>
-            <a:ext cx="9144000" cy="307777"/>
+            <a:ext cx="9144000" cy="261610"/>
           </a:xfrm>
           <a:prstGeom prst="rect">
             <a:avLst/>
@@ -4091,7 +4094,7 @@
           <a:p>
             <a:pPr algn="ctr"/>
             <a:r>
-              <a:rPr lang="en-US" altLang="ko-KR" sz="1400" dirty="0" smtClean="0">
+              <a:rPr lang="en-US" altLang="ko-KR" sz="1100" dirty="0" smtClean="0">
                 <a:solidFill>
                   <a:schemeClr val="tx1">
                     <a:lumMod val="75000"/>
@@ -4104,7 +4107,7 @@
               </a:rPr>
               <a:t>Copyright LACTROI – 2017</a:t>
             </a:r>
-            <a:endParaRPr lang="ko-KR" altLang="en-US" sz="1400" dirty="0">
+            <a:endParaRPr lang="ko-KR" altLang="en-US" sz="1100" dirty="0">
               <a:solidFill>
                 <a:schemeClr val="tx1">
                   <a:lumMod val="75000"/>
@@ -4422,7 +4425,7 @@
         <p:spPr>
           <a:xfrm>
             <a:off x="35497" y="2921124"/>
-            <a:ext cx="3240359" cy="400110"/>
+            <a:ext cx="3240359" cy="369332"/>
           </a:xfrm>
           <a:prstGeom prst="rect">
             <a:avLst/>
@@ -4445,7 +4448,7 @@
               <a:defRPr/>
             </a:pPr>
             <a:r>
-              <a:rPr lang="en-US" altLang="ko-KR" sz="2000" dirty="0" smtClean="0">
+              <a:rPr lang="en-US" altLang="ko-KR" dirty="0" smtClean="0">
                 <a:solidFill>
                   <a:schemeClr val="tx1">
                     <a:lumMod val="75000"/>
@@ -4459,7 +4462,7 @@
               <a:t>15HCB2 - LACTROI</a:t>
             </a:r>
             <a:r>
-              <a:rPr kumimoji="0" lang="en-US" altLang="ko-KR" sz="2000" dirty="0" smtClean="0">
+              <a:rPr kumimoji="0" lang="en-US" altLang="ko-KR" dirty="0" smtClean="0">
                 <a:solidFill>
                   <a:schemeClr val="tx1">
                     <a:lumMod val="75000"/>
@@ -4472,7 +4475,7 @@
               </a:rPr>
               <a:t>    </a:t>
             </a:r>
-            <a:endParaRPr kumimoji="0" lang="en-US" altLang="ko-KR" sz="2000" dirty="0">
+            <a:endParaRPr kumimoji="0" lang="en-US" altLang="ko-KR" dirty="0">
               <a:solidFill>
                 <a:schemeClr val="tx1">
                   <a:lumMod val="75000"/>
@@ -4519,7 +4522,94 @@
     </p:spTree>
     <p:extLst>
       <p:ext uri="{BB962C8B-B14F-4D97-AF65-F5344CB8AC3E}">
-        <p14:creationId xmlns:p14="http://schemas.microsoft.com/office/powerpoint/2010/main" val="1941221791"/>
+        <p14:creationId xmlns:p14="http://schemas.microsoft.com/office/powerpoint/2010/main" val="2812347413"/>
+      </p:ext>
+    </p:extLst>
+  </p:cSld>
+  <p:clrMapOvr>
+    <a:masterClrMapping/>
+  </p:clrMapOvr>
+</p:sld>
+</file>
+
+<file path=ppt/slides/slide10.xml><?xml version="1.0" encoding="utf-8"?>
+<p:sld xmlns:a="http://schemas.openxmlformats.org/drawingml/2006/main" xmlns:r="http://schemas.openxmlformats.org/officeDocument/2006/relationships" xmlns:p="http://schemas.openxmlformats.org/presentationml/2006/main">
+  <p:cSld>
+    <p:spTree>
+      <p:nvGrpSpPr>
+        <p:cNvPr id="1" name=""/>
+        <p:cNvGrpSpPr/>
+        <p:nvPr/>
+      </p:nvGrpSpPr>
+      <p:grpSpPr>
+        <a:xfrm>
+          <a:off x="0" y="0"/>
+          <a:ext cx="0" cy="0"/>
+          <a:chOff x="0" y="0"/>
+          <a:chExt cx="0" cy="0"/>
+        </a:xfrm>
+      </p:grpSpPr>
+      <p:sp>
+        <p:nvSpPr>
+          <p:cNvPr id="4" name="Title 3"/>
+          <p:cNvSpPr>
+            <a:spLocks noGrp="1"/>
+          </p:cNvSpPr>
+          <p:nvPr>
+            <p:ph type="title"/>
+          </p:nvPr>
+        </p:nvSpPr>
+        <p:spPr/>
+        <p:txBody>
+          <a:bodyPr/>
+          <a:lstStyle/>
+          <a:p>
+            <a:r>
+              <a:rPr lang="en-US" altLang="ko-KR" b="0" dirty="0" smtClean="0">
+                <a:latin typeface="Tahoma" panose="020B0604030504040204" pitchFamily="34" charset="0"/>
+                <a:ea typeface="Tahoma" panose="020B0604030504040204" pitchFamily="34" charset="0"/>
+                <a:cs typeface="Tahoma" panose="020B0604030504040204" pitchFamily="34" charset="0"/>
+              </a:rPr>
+              <a:t>Prototype – Trang </a:t>
+            </a:r>
+            <a:r>
+              <a:rPr lang="en-US" altLang="ko-KR" b="0" dirty="0" err="1" smtClean="0">
+                <a:latin typeface="Tahoma" panose="020B0604030504040204" pitchFamily="34" charset="0"/>
+                <a:ea typeface="Tahoma" panose="020B0604030504040204" pitchFamily="34" charset="0"/>
+                <a:cs typeface="Tahoma" panose="020B0604030504040204" pitchFamily="34" charset="0"/>
+              </a:rPr>
+              <a:t>chủ</a:t>
+            </a:r>
+            <a:endParaRPr lang="ko-KR" altLang="en-US" b="0" dirty="0">
+              <a:latin typeface="Tahoma" panose="020B0604030504040204" pitchFamily="34" charset="0"/>
+              <a:cs typeface="Tahoma" panose="020B0604030504040204" pitchFamily="34" charset="0"/>
+            </a:endParaRPr>
+          </a:p>
+        </p:txBody>
+      </p:sp>
+      <p:sp>
+        <p:nvSpPr>
+          <p:cNvPr id="7" name="Content Placeholder 6"/>
+          <p:cNvSpPr>
+            <a:spLocks noGrp="1"/>
+          </p:cNvSpPr>
+          <p:nvPr>
+            <p:ph idx="1"/>
+          </p:nvPr>
+        </p:nvSpPr>
+        <p:spPr/>
+        <p:txBody>
+          <a:bodyPr/>
+          <a:lstStyle/>
+          <a:p>
+            <a:endParaRPr lang="en-US"/>
+          </a:p>
+        </p:txBody>
+      </p:sp>
+    </p:spTree>
+    <p:extLst>
+      <p:ext uri="{BB962C8B-B14F-4D97-AF65-F5344CB8AC3E}">
+        <p14:creationId xmlns:p14="http://schemas.microsoft.com/office/powerpoint/2010/main" val="921677453"/>
       </p:ext>
     </p:extLst>
   </p:cSld>
@@ -4533,6 +4623,263 @@
       </p:par>
     </p:tnLst>
   </p:timing>
+</p:sld>
+</file>
+
+<file path=ppt/slides/slide11.xml><?xml version="1.0" encoding="utf-8"?>
+<p:sld xmlns:a="http://schemas.openxmlformats.org/drawingml/2006/main" xmlns:r="http://schemas.openxmlformats.org/officeDocument/2006/relationships" xmlns:p="http://schemas.openxmlformats.org/presentationml/2006/main">
+  <p:cSld>
+    <p:spTree>
+      <p:nvGrpSpPr>
+        <p:cNvPr id="1" name=""/>
+        <p:cNvGrpSpPr/>
+        <p:nvPr/>
+      </p:nvGrpSpPr>
+      <p:grpSpPr>
+        <a:xfrm>
+          <a:off x="0" y="0"/>
+          <a:ext cx="0" cy="0"/>
+          <a:chOff x="0" y="0"/>
+          <a:chExt cx="0" cy="0"/>
+        </a:xfrm>
+      </p:grpSpPr>
+      <p:sp>
+        <p:nvSpPr>
+          <p:cNvPr id="4" name="Title 3"/>
+          <p:cNvSpPr>
+            <a:spLocks noGrp="1"/>
+          </p:cNvSpPr>
+          <p:nvPr>
+            <p:ph type="title"/>
+          </p:nvPr>
+        </p:nvSpPr>
+        <p:spPr/>
+        <p:txBody>
+          <a:bodyPr/>
+          <a:lstStyle/>
+          <a:p>
+            <a:r>
+              <a:rPr lang="en-US" altLang="ko-KR" b="0" dirty="0" smtClean="0">
+                <a:latin typeface="Tahoma" panose="020B0604030504040204" pitchFamily="34" charset="0"/>
+                <a:ea typeface="Tahoma" panose="020B0604030504040204" pitchFamily="34" charset="0"/>
+                <a:cs typeface="Tahoma" panose="020B0604030504040204" pitchFamily="34" charset="0"/>
+              </a:rPr>
+              <a:t>Prototype – </a:t>
+            </a:r>
+            <a:r>
+              <a:rPr lang="en-US" altLang="ko-KR" b="0" dirty="0" err="1" smtClean="0">
+                <a:latin typeface="Tahoma" panose="020B0604030504040204" pitchFamily="34" charset="0"/>
+                <a:ea typeface="Tahoma" panose="020B0604030504040204" pitchFamily="34" charset="0"/>
+                <a:cs typeface="Tahoma" panose="020B0604030504040204" pitchFamily="34" charset="0"/>
+              </a:rPr>
+              <a:t>Tìm</a:t>
+            </a:r>
+            <a:r>
+              <a:rPr lang="en-US" altLang="ko-KR" b="0" dirty="0" smtClean="0">
+                <a:latin typeface="Tahoma" panose="020B0604030504040204" pitchFamily="34" charset="0"/>
+                <a:ea typeface="Tahoma" panose="020B0604030504040204" pitchFamily="34" charset="0"/>
+                <a:cs typeface="Tahoma" panose="020B0604030504040204" pitchFamily="34" charset="0"/>
+              </a:rPr>
+              <a:t> </a:t>
+            </a:r>
+            <a:r>
+              <a:rPr lang="en-US" altLang="ko-KR" b="0" dirty="0" err="1" smtClean="0">
+                <a:latin typeface="Tahoma" panose="020B0604030504040204" pitchFamily="34" charset="0"/>
+                <a:ea typeface="Tahoma" panose="020B0604030504040204" pitchFamily="34" charset="0"/>
+                <a:cs typeface="Tahoma" panose="020B0604030504040204" pitchFamily="34" charset="0"/>
+              </a:rPr>
+              <a:t>kiếm</a:t>
+            </a:r>
+            <a:r>
+              <a:rPr lang="en-US" altLang="ko-KR" b="0" dirty="0" smtClean="0">
+                <a:latin typeface="Tahoma" panose="020B0604030504040204" pitchFamily="34" charset="0"/>
+                <a:ea typeface="Tahoma" panose="020B0604030504040204" pitchFamily="34" charset="0"/>
+                <a:cs typeface="Tahoma" panose="020B0604030504040204" pitchFamily="34" charset="0"/>
+              </a:rPr>
+              <a:t> </a:t>
+            </a:r>
+            <a:r>
+              <a:rPr lang="en-US" altLang="ko-KR" b="0" dirty="0" err="1" smtClean="0">
+                <a:latin typeface="Tahoma" panose="020B0604030504040204" pitchFamily="34" charset="0"/>
+                <a:ea typeface="Tahoma" panose="020B0604030504040204" pitchFamily="34" charset="0"/>
+                <a:cs typeface="Tahoma" panose="020B0604030504040204" pitchFamily="34" charset="0"/>
+              </a:rPr>
+              <a:t>khoá</a:t>
+            </a:r>
+            <a:r>
+              <a:rPr lang="en-US" altLang="ko-KR" b="0" dirty="0" smtClean="0">
+                <a:latin typeface="Tahoma" panose="020B0604030504040204" pitchFamily="34" charset="0"/>
+                <a:ea typeface="Tahoma" panose="020B0604030504040204" pitchFamily="34" charset="0"/>
+                <a:cs typeface="Tahoma" panose="020B0604030504040204" pitchFamily="34" charset="0"/>
+              </a:rPr>
+              <a:t> </a:t>
+            </a:r>
+            <a:r>
+              <a:rPr lang="en-US" altLang="ko-KR" b="0" dirty="0" err="1" smtClean="0">
+                <a:latin typeface="Tahoma" panose="020B0604030504040204" pitchFamily="34" charset="0"/>
+                <a:ea typeface="Tahoma" panose="020B0604030504040204" pitchFamily="34" charset="0"/>
+                <a:cs typeface="Tahoma" panose="020B0604030504040204" pitchFamily="34" charset="0"/>
+              </a:rPr>
+              <a:t>học</a:t>
+            </a:r>
+            <a:endParaRPr lang="ko-KR" altLang="en-US" b="0" dirty="0">
+              <a:latin typeface="Tahoma" panose="020B0604030504040204" pitchFamily="34" charset="0"/>
+              <a:cs typeface="Tahoma" panose="020B0604030504040204" pitchFamily="34" charset="0"/>
+            </a:endParaRPr>
+          </a:p>
+        </p:txBody>
+      </p:sp>
+      <p:sp>
+        <p:nvSpPr>
+          <p:cNvPr id="7" name="Content Placeholder 6"/>
+          <p:cNvSpPr>
+            <a:spLocks noGrp="1"/>
+          </p:cNvSpPr>
+          <p:nvPr>
+            <p:ph idx="1"/>
+          </p:nvPr>
+        </p:nvSpPr>
+        <p:spPr/>
+        <p:txBody>
+          <a:bodyPr/>
+          <a:lstStyle/>
+          <a:p>
+            <a:endParaRPr lang="en-US"/>
+          </a:p>
+        </p:txBody>
+      </p:sp>
+    </p:spTree>
+    <p:extLst>
+      <p:ext uri="{BB962C8B-B14F-4D97-AF65-F5344CB8AC3E}">
+        <p14:creationId xmlns:p14="http://schemas.microsoft.com/office/powerpoint/2010/main" val="1990753192"/>
+      </p:ext>
+    </p:extLst>
+  </p:cSld>
+  <p:clrMapOvr>
+    <a:masterClrMapping/>
+  </p:clrMapOvr>
+  <p:timing>
+    <p:tnLst>
+      <p:par>
+        <p:cTn id="1" dur="indefinite" restart="never" nodeType="tmRoot"/>
+      </p:par>
+    </p:tnLst>
+  </p:timing>
+</p:sld>
+</file>
+
+<file path=ppt/slides/slide12.xml><?xml version="1.0" encoding="utf-8"?>
+<p:sld xmlns:a="http://schemas.openxmlformats.org/drawingml/2006/main" xmlns:r="http://schemas.openxmlformats.org/officeDocument/2006/relationships" xmlns:p="http://schemas.openxmlformats.org/presentationml/2006/main">
+  <p:cSld>
+    <p:spTree>
+      <p:nvGrpSpPr>
+        <p:cNvPr id="1" name=""/>
+        <p:cNvGrpSpPr/>
+        <p:nvPr/>
+      </p:nvGrpSpPr>
+      <p:grpSpPr>
+        <a:xfrm>
+          <a:off x="0" y="0"/>
+          <a:ext cx="0" cy="0"/>
+          <a:chOff x="0" y="0"/>
+          <a:chExt cx="0" cy="0"/>
+        </a:xfrm>
+      </p:grpSpPr>
+      <p:sp>
+        <p:nvSpPr>
+          <p:cNvPr id="4" name="Title 3"/>
+          <p:cNvSpPr>
+            <a:spLocks noGrp="1"/>
+          </p:cNvSpPr>
+          <p:nvPr>
+            <p:ph type="ctrTitle"/>
+          </p:nvPr>
+        </p:nvSpPr>
+        <p:spPr/>
+        <p:txBody>
+          <a:bodyPr/>
+          <a:lstStyle/>
+          <a:p>
+            <a:pPr algn="ctr"/>
+            <a:r>
+              <a:rPr lang="en-US" altLang="ko-KR" dirty="0" smtClean="0">
+                <a:latin typeface="Tahoma" panose="020B0604030504040204" pitchFamily="34" charset="0"/>
+                <a:ea typeface="Tahoma" panose="020B0604030504040204" pitchFamily="34" charset="0"/>
+                <a:cs typeface="Tahoma" panose="020B0604030504040204" pitchFamily="34" charset="0"/>
+              </a:rPr>
+              <a:t> </a:t>
+            </a:r>
+            <a:r>
+              <a:rPr lang="en-US" altLang="ko-KR" dirty="0" err="1" smtClean="0">
+                <a:latin typeface="Tahoma" panose="020B0604030504040204" pitchFamily="34" charset="0"/>
+                <a:ea typeface="Tahoma" panose="020B0604030504040204" pitchFamily="34" charset="0"/>
+                <a:cs typeface="Tahoma" panose="020B0604030504040204" pitchFamily="34" charset="0"/>
+              </a:rPr>
+              <a:t>Hỏi</a:t>
+            </a:r>
+            <a:r>
+              <a:rPr lang="en-US" altLang="ko-KR" dirty="0" smtClean="0">
+                <a:latin typeface="Tahoma" panose="020B0604030504040204" pitchFamily="34" charset="0"/>
+                <a:ea typeface="Tahoma" panose="020B0604030504040204" pitchFamily="34" charset="0"/>
+                <a:cs typeface="Tahoma" panose="020B0604030504040204" pitchFamily="34" charset="0"/>
+              </a:rPr>
+              <a:t> </a:t>
+            </a:r>
+            <a:r>
+              <a:rPr lang="en-US" altLang="ko-KR" dirty="0" err="1" smtClean="0">
+                <a:latin typeface="Tahoma" panose="020B0604030504040204" pitchFamily="34" charset="0"/>
+                <a:ea typeface="Tahoma" panose="020B0604030504040204" pitchFamily="34" charset="0"/>
+                <a:cs typeface="Tahoma" panose="020B0604030504040204" pitchFamily="34" charset="0"/>
+              </a:rPr>
+              <a:t>đáp</a:t>
+            </a:r>
+            <a:endParaRPr lang="ko-KR" altLang="en-US" dirty="0">
+              <a:latin typeface="Tahoma" panose="020B0604030504040204" pitchFamily="34" charset="0"/>
+              <a:cs typeface="Tahoma" panose="020B0604030504040204" pitchFamily="34" charset="0"/>
+            </a:endParaRPr>
+          </a:p>
+        </p:txBody>
+      </p:sp>
+      <p:pic>
+        <p:nvPicPr>
+          <p:cNvPr id="3" name="Picture 2"/>
+          <p:cNvPicPr>
+            <a:picLocks noChangeAspect="1"/>
+          </p:cNvPicPr>
+          <p:nvPr/>
+        </p:nvPicPr>
+        <p:blipFill>
+          <a:blip r:embed="rId2">
+            <a:extLst>
+              <a:ext uri="{28A0092B-C50C-407E-A947-70E740481C1C}">
+                <a14:useLocalDpi xmlns:a14="http://schemas.microsoft.com/office/drawing/2010/main" val="0"/>
+              </a:ext>
+            </a:extLst>
+          </a:blip>
+          <a:stretch>
+            <a:fillRect/>
+          </a:stretch>
+        </p:blipFill>
+        <p:spPr>
+          <a:xfrm>
+            <a:off x="0" y="4437112"/>
+            <a:ext cx="9133984" cy="2420889"/>
+          </a:xfrm>
+          <a:prstGeom prst="rect">
+            <a:avLst/>
+          </a:prstGeom>
+        </p:spPr>
+      </p:pic>
+    </p:spTree>
+    <p:extLst>
+      <p:ext uri="{BB962C8B-B14F-4D97-AF65-F5344CB8AC3E}">
+        <p14:creationId xmlns:p14="http://schemas.microsoft.com/office/powerpoint/2010/main" val="3659674305"/>
+      </p:ext>
+    </p:extLst>
+  </p:cSld>
+  <p:clrMapOvr>
+    <a:masterClrMapping/>
+  </p:clrMapOvr>
 </p:sld>
 </file>
 
@@ -6130,6 +6477,362 @@
 </file>
 
 <file path=ppt/slides/slide4.xml><?xml version="1.0" encoding="utf-8"?>
+<p:sld xmlns:a="http://schemas.openxmlformats.org/drawingml/2006/main" xmlns:r="http://schemas.openxmlformats.org/officeDocument/2006/relationships" xmlns:p="http://schemas.openxmlformats.org/presentationml/2006/main">
+  <p:cSld>
+    <p:spTree>
+      <p:nvGrpSpPr>
+        <p:cNvPr id="1" name=""/>
+        <p:cNvGrpSpPr/>
+        <p:nvPr/>
+      </p:nvGrpSpPr>
+      <p:grpSpPr>
+        <a:xfrm>
+          <a:off x="0" y="0"/>
+          <a:ext cx="0" cy="0"/>
+          <a:chOff x="0" y="0"/>
+          <a:chExt cx="0" cy="0"/>
+        </a:xfrm>
+      </p:grpSpPr>
+      <p:sp>
+        <p:nvSpPr>
+          <p:cNvPr id="4" name="Title 3"/>
+          <p:cNvSpPr>
+            <a:spLocks noGrp="1"/>
+          </p:cNvSpPr>
+          <p:nvPr>
+            <p:ph type="title"/>
+          </p:nvPr>
+        </p:nvSpPr>
+        <p:spPr/>
+        <p:txBody>
+          <a:bodyPr/>
+          <a:lstStyle/>
+          <a:p>
+            <a:r>
+              <a:rPr lang="en-US" altLang="ko-KR" b="0" dirty="0" smtClean="0">
+                <a:latin typeface="Tahoma" panose="020B0604030504040204" pitchFamily="34" charset="0"/>
+                <a:ea typeface="Tahoma" panose="020B0604030504040204" pitchFamily="34" charset="0"/>
+                <a:cs typeface="Tahoma" panose="020B0604030504040204" pitchFamily="34" charset="0"/>
+              </a:rPr>
+              <a:t> </a:t>
+            </a:r>
+            <a:r>
+              <a:rPr lang="en-US" altLang="ko-KR" b="0" dirty="0" err="1" smtClean="0">
+                <a:latin typeface="Tahoma" panose="020B0604030504040204" pitchFamily="34" charset="0"/>
+                <a:ea typeface="Tahoma" panose="020B0604030504040204" pitchFamily="34" charset="0"/>
+                <a:cs typeface="Tahoma" panose="020B0604030504040204" pitchFamily="34" charset="0"/>
+              </a:rPr>
+              <a:t>Đối</a:t>
+            </a:r>
+            <a:r>
+              <a:rPr lang="en-US" altLang="ko-KR" b="0" dirty="0" smtClean="0">
+                <a:latin typeface="Tahoma" panose="020B0604030504040204" pitchFamily="34" charset="0"/>
+                <a:ea typeface="Tahoma" panose="020B0604030504040204" pitchFamily="34" charset="0"/>
+                <a:cs typeface="Tahoma" panose="020B0604030504040204" pitchFamily="34" charset="0"/>
+              </a:rPr>
+              <a:t> </a:t>
+            </a:r>
+            <a:r>
+              <a:rPr lang="en-US" altLang="ko-KR" b="0" dirty="0" err="1" smtClean="0">
+                <a:latin typeface="Tahoma" panose="020B0604030504040204" pitchFamily="34" charset="0"/>
+                <a:ea typeface="Tahoma" panose="020B0604030504040204" pitchFamily="34" charset="0"/>
+                <a:cs typeface="Tahoma" panose="020B0604030504040204" pitchFamily="34" charset="0"/>
+              </a:rPr>
+              <a:t>tượng</a:t>
+            </a:r>
+            <a:r>
+              <a:rPr lang="en-US" altLang="ko-KR" b="0" dirty="0" smtClean="0">
+                <a:latin typeface="Tahoma" panose="020B0604030504040204" pitchFamily="34" charset="0"/>
+                <a:ea typeface="Tahoma" panose="020B0604030504040204" pitchFamily="34" charset="0"/>
+                <a:cs typeface="Tahoma" panose="020B0604030504040204" pitchFamily="34" charset="0"/>
+              </a:rPr>
+              <a:t> </a:t>
+            </a:r>
+            <a:r>
+              <a:rPr lang="en-US" altLang="ko-KR" b="0" dirty="0" err="1" smtClean="0">
+                <a:latin typeface="Tahoma" panose="020B0604030504040204" pitchFamily="34" charset="0"/>
+                <a:ea typeface="Tahoma" panose="020B0604030504040204" pitchFamily="34" charset="0"/>
+                <a:cs typeface="Tahoma" panose="020B0604030504040204" pitchFamily="34" charset="0"/>
+              </a:rPr>
+              <a:t>người</a:t>
+            </a:r>
+            <a:r>
+              <a:rPr lang="en-US" altLang="ko-KR" b="0" dirty="0" smtClean="0">
+                <a:latin typeface="Tahoma" panose="020B0604030504040204" pitchFamily="34" charset="0"/>
+                <a:ea typeface="Tahoma" panose="020B0604030504040204" pitchFamily="34" charset="0"/>
+                <a:cs typeface="Tahoma" panose="020B0604030504040204" pitchFamily="34" charset="0"/>
+              </a:rPr>
+              <a:t> </a:t>
+            </a:r>
+            <a:r>
+              <a:rPr lang="en-US" altLang="ko-KR" b="0" dirty="0" err="1" smtClean="0">
+                <a:latin typeface="Tahoma" panose="020B0604030504040204" pitchFamily="34" charset="0"/>
+                <a:ea typeface="Tahoma" panose="020B0604030504040204" pitchFamily="34" charset="0"/>
+                <a:cs typeface="Tahoma" panose="020B0604030504040204" pitchFamily="34" charset="0"/>
+              </a:rPr>
+              <a:t>dùng</a:t>
+            </a:r>
+            <a:endParaRPr lang="ko-KR" altLang="en-US" b="0" dirty="0">
+              <a:latin typeface="Tahoma" panose="020B0604030504040204" pitchFamily="34" charset="0"/>
+              <a:cs typeface="Tahoma" panose="020B0604030504040204" pitchFamily="34" charset="0"/>
+            </a:endParaRPr>
+          </a:p>
+        </p:txBody>
+      </p:sp>
+      <p:sp>
+        <p:nvSpPr>
+          <p:cNvPr id="9" name="Content Placeholder 8"/>
+          <p:cNvSpPr>
+            <a:spLocks noGrp="1"/>
+          </p:cNvSpPr>
+          <p:nvPr>
+            <p:ph idx="10"/>
+          </p:nvPr>
+        </p:nvSpPr>
+        <p:spPr>
+          <a:xfrm>
+            <a:off x="539552" y="1772816"/>
+            <a:ext cx="8229600" cy="3888432"/>
+          </a:xfrm>
+        </p:spPr>
+        <p:txBody>
+          <a:bodyPr/>
+          <a:lstStyle/>
+          <a:p>
+            <a:pPr marL="457200" indent="-457200">
+              <a:buAutoNum type="arabicPeriod"/>
+            </a:pPr>
+            <a:r>
+              <a:rPr lang="en-US" sz="2400" dirty="0" err="1" smtClean="0">
+                <a:latin typeface="Tahoma" panose="020B0604030504040204" pitchFamily="34" charset="0"/>
+                <a:ea typeface="Tahoma" panose="020B0604030504040204" pitchFamily="34" charset="0"/>
+                <a:cs typeface="Tahoma" panose="020B0604030504040204" pitchFamily="34" charset="0"/>
+              </a:rPr>
+              <a:t>Nội</a:t>
+            </a:r>
+            <a:r>
+              <a:rPr lang="en-US" sz="2400" dirty="0" smtClean="0">
+                <a:latin typeface="Tahoma" panose="020B0604030504040204" pitchFamily="34" charset="0"/>
+                <a:ea typeface="Tahoma" panose="020B0604030504040204" pitchFamily="34" charset="0"/>
+                <a:cs typeface="Tahoma" panose="020B0604030504040204" pitchFamily="34" charset="0"/>
+              </a:rPr>
+              <a:t> </a:t>
+            </a:r>
+            <a:r>
+              <a:rPr lang="en-US" sz="2400" dirty="0" err="1" smtClean="0">
+                <a:latin typeface="Tahoma" panose="020B0604030504040204" pitchFamily="34" charset="0"/>
+                <a:ea typeface="Tahoma" panose="020B0604030504040204" pitchFamily="34" charset="0"/>
+                <a:cs typeface="Tahoma" panose="020B0604030504040204" pitchFamily="34" charset="0"/>
+              </a:rPr>
+              <a:t>trợ</a:t>
+            </a:r>
+            <a:endParaRPr lang="en-US" sz="2400" dirty="0" smtClean="0">
+              <a:latin typeface="Tahoma" panose="020B0604030504040204" pitchFamily="34" charset="0"/>
+              <a:ea typeface="Tahoma" panose="020B0604030504040204" pitchFamily="34" charset="0"/>
+              <a:cs typeface="Tahoma" panose="020B0604030504040204" pitchFamily="34" charset="0"/>
+            </a:endParaRPr>
+          </a:p>
+          <a:p>
+            <a:pPr marL="457200" indent="-457200">
+              <a:buAutoNum type="arabicPeriod"/>
+            </a:pPr>
+            <a:endParaRPr lang="en-US" sz="2400" dirty="0">
+              <a:latin typeface="Tahoma" panose="020B0604030504040204" pitchFamily="34" charset="0"/>
+              <a:ea typeface="Tahoma" panose="020B0604030504040204" pitchFamily="34" charset="0"/>
+              <a:cs typeface="Tahoma" panose="020B0604030504040204" pitchFamily="34" charset="0"/>
+            </a:endParaRPr>
+          </a:p>
+          <a:p>
+            <a:pPr marL="457200" indent="-457200">
+              <a:buAutoNum type="arabicPeriod"/>
+            </a:pPr>
+            <a:r>
+              <a:rPr lang="en-US" sz="2400" dirty="0" err="1" smtClean="0">
+                <a:latin typeface="Tahoma" panose="020B0604030504040204" pitchFamily="34" charset="0"/>
+                <a:ea typeface="Tahoma" panose="020B0604030504040204" pitchFamily="34" charset="0"/>
+                <a:cs typeface="Tahoma" panose="020B0604030504040204" pitchFamily="34" charset="0"/>
+              </a:rPr>
+              <a:t>Công</a:t>
+            </a:r>
+            <a:r>
+              <a:rPr lang="en-US" sz="2400" dirty="0" smtClean="0">
+                <a:latin typeface="Tahoma" panose="020B0604030504040204" pitchFamily="34" charset="0"/>
+                <a:ea typeface="Tahoma" panose="020B0604030504040204" pitchFamily="34" charset="0"/>
+                <a:cs typeface="Tahoma" panose="020B0604030504040204" pitchFamily="34" charset="0"/>
+              </a:rPr>
+              <a:t> </a:t>
+            </a:r>
+            <a:r>
+              <a:rPr lang="en-US" sz="2400" dirty="0" err="1" smtClean="0">
+                <a:latin typeface="Tahoma" panose="020B0604030504040204" pitchFamily="34" charset="0"/>
+                <a:ea typeface="Tahoma" panose="020B0604030504040204" pitchFamily="34" charset="0"/>
+                <a:cs typeface="Tahoma" panose="020B0604030504040204" pitchFamily="34" charset="0"/>
+              </a:rPr>
+              <a:t>nhân</a:t>
+            </a:r>
+            <a:r>
+              <a:rPr lang="en-US" sz="2400" dirty="0" smtClean="0">
+                <a:latin typeface="Tahoma" panose="020B0604030504040204" pitchFamily="34" charset="0"/>
+                <a:ea typeface="Tahoma" panose="020B0604030504040204" pitchFamily="34" charset="0"/>
+                <a:cs typeface="Tahoma" panose="020B0604030504040204" pitchFamily="34" charset="0"/>
+              </a:rPr>
+              <a:t> </a:t>
+            </a:r>
+            <a:r>
+              <a:rPr lang="en-US" sz="2400" dirty="0" err="1" smtClean="0">
+                <a:latin typeface="Tahoma" panose="020B0604030504040204" pitchFamily="34" charset="0"/>
+                <a:ea typeface="Tahoma" panose="020B0604030504040204" pitchFamily="34" charset="0"/>
+                <a:cs typeface="Tahoma" panose="020B0604030504040204" pitchFamily="34" charset="0"/>
+              </a:rPr>
+              <a:t>viên</a:t>
+            </a:r>
+            <a:r>
+              <a:rPr lang="en-US" sz="2400" dirty="0" smtClean="0">
+                <a:latin typeface="Tahoma" panose="020B0604030504040204" pitchFamily="34" charset="0"/>
+                <a:ea typeface="Tahoma" panose="020B0604030504040204" pitchFamily="34" charset="0"/>
+                <a:cs typeface="Tahoma" panose="020B0604030504040204" pitchFamily="34" charset="0"/>
+              </a:rPr>
+              <a:t> </a:t>
+            </a:r>
+            <a:r>
+              <a:rPr lang="en-US" sz="2400" dirty="0" err="1" smtClean="0">
+                <a:latin typeface="Tahoma" panose="020B0604030504040204" pitchFamily="34" charset="0"/>
+                <a:ea typeface="Tahoma" panose="020B0604030504040204" pitchFamily="34" charset="0"/>
+                <a:cs typeface="Tahoma" panose="020B0604030504040204" pitchFamily="34" charset="0"/>
+              </a:rPr>
+              <a:t>chức</a:t>
+            </a:r>
+            <a:endParaRPr lang="en-US" sz="2400" dirty="0" smtClean="0">
+              <a:latin typeface="Tahoma" panose="020B0604030504040204" pitchFamily="34" charset="0"/>
+              <a:ea typeface="Tahoma" panose="020B0604030504040204" pitchFamily="34" charset="0"/>
+              <a:cs typeface="Tahoma" panose="020B0604030504040204" pitchFamily="34" charset="0"/>
+            </a:endParaRPr>
+          </a:p>
+          <a:p>
+            <a:pPr marL="457200" indent="-457200">
+              <a:buAutoNum type="arabicPeriod"/>
+            </a:pPr>
+            <a:endParaRPr lang="en-US" sz="2400" dirty="0">
+              <a:latin typeface="Tahoma" panose="020B0604030504040204" pitchFamily="34" charset="0"/>
+              <a:ea typeface="Tahoma" panose="020B0604030504040204" pitchFamily="34" charset="0"/>
+              <a:cs typeface="Tahoma" panose="020B0604030504040204" pitchFamily="34" charset="0"/>
+            </a:endParaRPr>
+          </a:p>
+          <a:p>
+            <a:pPr marL="457200" indent="-457200">
+              <a:buAutoNum type="arabicPeriod"/>
+            </a:pPr>
+            <a:r>
+              <a:rPr lang="en-US" sz="2400" dirty="0" err="1" smtClean="0">
+                <a:latin typeface="Tahoma" panose="020B0604030504040204" pitchFamily="34" charset="0"/>
+                <a:ea typeface="Tahoma" panose="020B0604030504040204" pitchFamily="34" charset="0"/>
+                <a:cs typeface="Tahoma" panose="020B0604030504040204" pitchFamily="34" charset="0"/>
+              </a:rPr>
+              <a:t>Học</a:t>
+            </a:r>
+            <a:r>
+              <a:rPr lang="en-US" sz="2400" dirty="0" smtClean="0">
+                <a:latin typeface="Tahoma" panose="020B0604030504040204" pitchFamily="34" charset="0"/>
+                <a:ea typeface="Tahoma" panose="020B0604030504040204" pitchFamily="34" charset="0"/>
+                <a:cs typeface="Tahoma" panose="020B0604030504040204" pitchFamily="34" charset="0"/>
+              </a:rPr>
+              <a:t> </a:t>
+            </a:r>
+            <a:r>
+              <a:rPr lang="en-US" sz="2400" dirty="0" err="1" smtClean="0">
+                <a:latin typeface="Tahoma" panose="020B0604030504040204" pitchFamily="34" charset="0"/>
+                <a:ea typeface="Tahoma" panose="020B0604030504040204" pitchFamily="34" charset="0"/>
+                <a:cs typeface="Tahoma" panose="020B0604030504040204" pitchFamily="34" charset="0"/>
+              </a:rPr>
+              <a:t>sinh</a:t>
+            </a:r>
+            <a:r>
+              <a:rPr lang="en-US" sz="2400" dirty="0" smtClean="0">
+                <a:latin typeface="Tahoma" panose="020B0604030504040204" pitchFamily="34" charset="0"/>
+                <a:ea typeface="Tahoma" panose="020B0604030504040204" pitchFamily="34" charset="0"/>
+                <a:cs typeface="Tahoma" panose="020B0604030504040204" pitchFamily="34" charset="0"/>
+              </a:rPr>
+              <a:t>, </a:t>
+            </a:r>
+            <a:r>
+              <a:rPr lang="en-US" sz="2400" dirty="0" err="1" smtClean="0">
+                <a:latin typeface="Tahoma" panose="020B0604030504040204" pitchFamily="34" charset="0"/>
+                <a:ea typeface="Tahoma" panose="020B0604030504040204" pitchFamily="34" charset="0"/>
+                <a:cs typeface="Tahoma" panose="020B0604030504040204" pitchFamily="34" charset="0"/>
+              </a:rPr>
+              <a:t>sinh</a:t>
+            </a:r>
+            <a:r>
+              <a:rPr lang="en-US" sz="2400" dirty="0" smtClean="0">
+                <a:latin typeface="Tahoma" panose="020B0604030504040204" pitchFamily="34" charset="0"/>
+                <a:ea typeface="Tahoma" panose="020B0604030504040204" pitchFamily="34" charset="0"/>
+                <a:cs typeface="Tahoma" panose="020B0604030504040204" pitchFamily="34" charset="0"/>
+              </a:rPr>
+              <a:t> </a:t>
+            </a:r>
+            <a:r>
+              <a:rPr lang="en-US" sz="2400" dirty="0" err="1" smtClean="0">
+                <a:latin typeface="Tahoma" panose="020B0604030504040204" pitchFamily="34" charset="0"/>
+                <a:ea typeface="Tahoma" panose="020B0604030504040204" pitchFamily="34" charset="0"/>
+                <a:cs typeface="Tahoma" panose="020B0604030504040204" pitchFamily="34" charset="0"/>
+              </a:rPr>
+              <a:t>viên</a:t>
+            </a:r>
+            <a:endParaRPr lang="en-US" sz="2400" dirty="0"/>
+          </a:p>
+        </p:txBody>
+      </p:sp>
+      <p:pic>
+        <p:nvPicPr>
+          <p:cNvPr id="2" name="Picture 1"/>
+          <p:cNvPicPr>
+            <a:picLocks noChangeAspect="1"/>
+          </p:cNvPicPr>
+          <p:nvPr/>
+        </p:nvPicPr>
+        <p:blipFill>
+          <a:blip r:embed="rId2">
+            <a:extLst>
+              <a:ext uri="{28A0092B-C50C-407E-A947-70E740481C1C}">
+                <a14:useLocalDpi xmlns:a14="http://schemas.microsoft.com/office/drawing/2010/main" val="0"/>
+              </a:ext>
+            </a:extLst>
+          </a:blip>
+          <a:stretch>
+            <a:fillRect/>
+          </a:stretch>
+        </p:blipFill>
+        <p:spPr>
+          <a:xfrm>
+            <a:off x="6640573" y="3933056"/>
+            <a:ext cx="2143125" cy="2143125"/>
+          </a:xfrm>
+          <a:prstGeom prst="rect">
+            <a:avLst/>
+          </a:prstGeom>
+        </p:spPr>
+      </p:pic>
+    </p:spTree>
+    <p:extLst>
+      <p:ext uri="{BB962C8B-B14F-4D97-AF65-F5344CB8AC3E}">
+        <p14:creationId xmlns:p14="http://schemas.microsoft.com/office/powerpoint/2010/main" val="2714020686"/>
+      </p:ext>
+    </p:extLst>
+  </p:cSld>
+  <p:clrMapOvr>
+    <a:masterClrMapping/>
+  </p:clrMapOvr>
+  <p:timing>
+    <p:tnLst>
+      <p:par>
+        <p:cTn id="1" dur="indefinite" restart="never" nodeType="tmRoot"/>
+      </p:par>
+    </p:tnLst>
+  </p:timing>
+</p:sld>
+</file>
+
+<file path=ppt/slides/slide5.xml><?xml version="1.0" encoding="utf-8"?>
 <p:sld xmlns:a="http://schemas.openxmlformats.org/drawingml/2006/main" xmlns:r="http://schemas.openxmlformats.org/officeDocument/2006/relationships" xmlns:p="http://schemas.openxmlformats.org/presentationml/2006/main">
   <p:cSld>
     <p:spTree>
@@ -6795,7 +7498,7 @@
 </p:sld>
 </file>
 
-<file path=ppt/slides/slide5.xml><?xml version="1.0" encoding="utf-8"?>
+<file path=ppt/slides/slide6.xml><?xml version="1.0" encoding="utf-8"?>
 <p:sld xmlns:a="http://schemas.openxmlformats.org/drawingml/2006/main" xmlns:r="http://schemas.openxmlformats.org/officeDocument/2006/relationships" xmlns:p="http://schemas.openxmlformats.org/presentationml/2006/main">
   <p:cSld>
     <p:spTree>
@@ -7130,7 +7833,7 @@
 </p:sld>
 </file>
 
-<file path=ppt/slides/slide6.xml><?xml version="1.0" encoding="utf-8"?>
+<file path=ppt/slides/slide7.xml><?xml version="1.0" encoding="utf-8"?>
 <p:sld xmlns:a="http://schemas.openxmlformats.org/drawingml/2006/main" xmlns:r="http://schemas.openxmlformats.org/officeDocument/2006/relationships" xmlns:p="http://schemas.openxmlformats.org/presentationml/2006/main">
   <p:cSld>
     <p:spTree>
@@ -7420,7 +8123,7 @@
 </p:sld>
 </file>
 
-<file path=ppt/slides/slide7.xml><?xml version="1.0" encoding="utf-8"?>
+<file path=ppt/slides/slide8.xml><?xml version="1.0" encoding="utf-8"?>
 <p:sld xmlns:a="http://schemas.openxmlformats.org/drawingml/2006/main" xmlns:r="http://schemas.openxmlformats.org/officeDocument/2006/relationships" xmlns:p="http://schemas.openxmlformats.org/presentationml/2006/main">
   <p:cSld>
     <p:spTree>
@@ -7963,7 +8666,7 @@
               <a:t>Udemy</a:t>
             </a:r>
             <a:r>
-              <a:rPr lang="en-US" altLang="ko-KR" sz="1400" dirty="0">
+              <a:rPr lang="en-US" altLang="ko-KR" sz="1400" dirty="0" smtClean="0">
                 <a:solidFill>
                   <a:schemeClr val="tx1">
                     <a:lumMod val="75000"/>
@@ -7974,7 +8677,21 @@
                 <a:ea typeface="Tahoma" panose="020B0604030504040204" pitchFamily="34" charset="0"/>
                 <a:cs typeface="Tahoma" panose="020B0604030504040204" pitchFamily="34" charset="0"/>
               </a:rPr>
-              <a:t>– https://www.udemy.com</a:t>
+              <a:t> – </a:t>
+            </a:r>
+            <a:r>
+              <a:rPr lang="en-US" altLang="ko-KR" sz="1400" dirty="0">
+                <a:solidFill>
+                  <a:schemeClr val="tx1">
+                    <a:lumMod val="75000"/>
+                    <a:lumOff val="25000"/>
+                  </a:schemeClr>
+                </a:solidFill>
+                <a:latin typeface="Tahoma" panose="020B0604030504040204" pitchFamily="34" charset="0"/>
+                <a:ea typeface="Tahoma" panose="020B0604030504040204" pitchFamily="34" charset="0"/>
+                <a:cs typeface="Tahoma" panose="020B0604030504040204" pitchFamily="34" charset="0"/>
+              </a:rPr>
+              <a:t>https://www.udemy.com</a:t>
             </a:r>
             <a:endParaRPr lang="ko-KR" altLang="en-US" sz="1400" dirty="0">
               <a:solidFill>
@@ -8009,7 +8726,7 @@
 </p:sld>
 </file>
 
-<file path=ppt/slides/slide8.xml><?xml version="1.0" encoding="utf-8"?>
+<file path=ppt/slides/slide9.xml><?xml version="1.0" encoding="utf-8"?>
 <p:sld xmlns:a="http://schemas.openxmlformats.org/drawingml/2006/main" xmlns:r="http://schemas.openxmlformats.org/officeDocument/2006/relationships" xmlns:p="http://schemas.openxmlformats.org/presentationml/2006/main">
   <p:cSld>
     <p:spTree>
@@ -8635,121 +9352,6 @@
       </p:par>
     </p:tnLst>
   </p:timing>
-</p:sld>
-</file>
-
-<file path=ppt/slides/slide9.xml><?xml version="1.0" encoding="utf-8"?>
-<p:sld xmlns:a="http://schemas.openxmlformats.org/drawingml/2006/main" xmlns:r="http://schemas.openxmlformats.org/officeDocument/2006/relationships" xmlns:p="http://schemas.openxmlformats.org/presentationml/2006/main">
-  <p:cSld>
-    <p:spTree>
-      <p:nvGrpSpPr>
-        <p:cNvPr id="1" name=""/>
-        <p:cNvGrpSpPr/>
-        <p:nvPr/>
-      </p:nvGrpSpPr>
-      <p:grpSpPr>
-        <a:xfrm>
-          <a:off x="0" y="0"/>
-          <a:ext cx="0" cy="0"/>
-          <a:chOff x="0" y="0"/>
-          <a:chExt cx="0" cy="0"/>
-        </a:xfrm>
-      </p:grpSpPr>
-      <p:sp>
-        <p:nvSpPr>
-          <p:cNvPr id="4" name="Title 3"/>
-          <p:cNvSpPr>
-            <a:spLocks noGrp="1"/>
-          </p:cNvSpPr>
-          <p:nvPr>
-            <p:ph type="ctrTitle"/>
-          </p:nvPr>
-        </p:nvSpPr>
-        <p:spPr/>
-        <p:txBody>
-          <a:bodyPr/>
-          <a:lstStyle/>
-          <a:p>
-            <a:pPr algn="ctr"/>
-            <a:r>
-              <a:rPr lang="en-US" altLang="ko-KR" dirty="0" smtClean="0">
-                <a:latin typeface="Tahoma" panose="020B0604030504040204" pitchFamily="34" charset="0"/>
-                <a:ea typeface="Tahoma" panose="020B0604030504040204" pitchFamily="34" charset="0"/>
-                <a:cs typeface="Tahoma" panose="020B0604030504040204" pitchFamily="34" charset="0"/>
-              </a:rPr>
-              <a:t> </a:t>
-            </a:r>
-            <a:r>
-              <a:rPr lang="en-US" altLang="ko-KR" dirty="0" err="1" smtClean="0">
-                <a:latin typeface="Tahoma" panose="020B0604030504040204" pitchFamily="34" charset="0"/>
-                <a:ea typeface="Tahoma" panose="020B0604030504040204" pitchFamily="34" charset="0"/>
-                <a:cs typeface="Tahoma" panose="020B0604030504040204" pitchFamily="34" charset="0"/>
-              </a:rPr>
-              <a:t>Hỏi</a:t>
-            </a:r>
-            <a:r>
-              <a:rPr lang="en-US" altLang="ko-KR" dirty="0" smtClean="0">
-                <a:latin typeface="Tahoma" panose="020B0604030504040204" pitchFamily="34" charset="0"/>
-                <a:ea typeface="Tahoma" panose="020B0604030504040204" pitchFamily="34" charset="0"/>
-                <a:cs typeface="Tahoma" panose="020B0604030504040204" pitchFamily="34" charset="0"/>
-              </a:rPr>
-              <a:t> </a:t>
-            </a:r>
-            <a:r>
-              <a:rPr lang="en-US" altLang="ko-KR" dirty="0" err="1" smtClean="0">
-                <a:latin typeface="Tahoma" panose="020B0604030504040204" pitchFamily="34" charset="0"/>
-                <a:ea typeface="Tahoma" panose="020B0604030504040204" pitchFamily="34" charset="0"/>
-                <a:cs typeface="Tahoma" panose="020B0604030504040204" pitchFamily="34" charset="0"/>
-              </a:rPr>
-              <a:t>đáp</a:t>
-            </a:r>
-            <a:endParaRPr lang="ko-KR" altLang="en-US" dirty="0">
-              <a:latin typeface="Tahoma" panose="020B0604030504040204" pitchFamily="34" charset="0"/>
-              <a:cs typeface="Tahoma" panose="020B0604030504040204" pitchFamily="34" charset="0"/>
-            </a:endParaRPr>
-          </a:p>
-        </p:txBody>
-      </p:sp>
-      <p:pic>
-        <p:nvPicPr>
-          <p:cNvPr id="3" name="Picture 2"/>
-          <p:cNvPicPr>
-            <a:picLocks noChangeAspect="1"/>
-          </p:cNvPicPr>
-          <p:nvPr/>
-        </p:nvPicPr>
-        <p:blipFill>
-          <a:blip r:embed="rId2">
-            <a:extLst>
-              <a:ext uri="{28A0092B-C50C-407E-A947-70E740481C1C}">
-                <a14:useLocalDpi xmlns:a14="http://schemas.microsoft.com/office/drawing/2010/main" val="0"/>
-              </a:ext>
-            </a:extLst>
-          </a:blip>
-          <a:stretch>
-            <a:fillRect/>
-          </a:stretch>
-        </p:blipFill>
-        <p:spPr>
-          <a:xfrm>
-            <a:off x="0" y="4437112"/>
-            <a:ext cx="9133984" cy="2420889"/>
-          </a:xfrm>
-          <a:prstGeom prst="rect">
-            <a:avLst/>
-          </a:prstGeom>
-        </p:spPr>
-      </p:pic>
-    </p:spTree>
-    <p:extLst>
-      <p:ext uri="{BB962C8B-B14F-4D97-AF65-F5344CB8AC3E}">
-        <p14:creationId xmlns:p14="http://schemas.microsoft.com/office/powerpoint/2010/main" val="3659674305"/>
-      </p:ext>
-    </p:extLst>
-  </p:cSld>
-  <p:clrMapOvr>
-    <a:masterClrMapping/>
-  </p:clrMapOvr>
 </p:sld>
 </file>
 

</xml_diff>